<commit_message>
updated version for the 2014 FI network
</commit_message>
<xml_diff>
--- a/doc/FIConstructionWorkFlow.pptx
+++ b/doc/FIConstructionWorkFlow.pptx
@@ -288,7 +288,7 @@
           <a:p>
             <a:fld id="{BD359BB1-992F-D24C-A539-F1AEC9179E2A}" type="datetimeFigureOut">
               <a:rPr lang="en-US" smtClean="0"/>
-              <a:t>1/10/12</a:t>
+              <a:t>12/15/14</a:t>
             </a:fld>
             <a:endParaRPr lang="en-US"/>
           </a:p>
@@ -458,7 +458,7 @@
           <a:p>
             <a:fld id="{BD359BB1-992F-D24C-A539-F1AEC9179E2A}" type="datetimeFigureOut">
               <a:rPr lang="en-US" smtClean="0"/>
-              <a:t>1/10/12</a:t>
+              <a:t>12/15/14</a:t>
             </a:fld>
             <a:endParaRPr lang="en-US"/>
           </a:p>
@@ -638,7 +638,7 @@
           <a:p>
             <a:fld id="{BD359BB1-992F-D24C-A539-F1AEC9179E2A}" type="datetimeFigureOut">
               <a:rPr lang="en-US" smtClean="0"/>
-              <a:t>1/10/12</a:t>
+              <a:t>12/15/14</a:t>
             </a:fld>
             <a:endParaRPr lang="en-US"/>
           </a:p>
@@ -808,7 +808,7 @@
           <a:p>
             <a:fld id="{BD359BB1-992F-D24C-A539-F1AEC9179E2A}" type="datetimeFigureOut">
               <a:rPr lang="en-US" smtClean="0"/>
-              <a:t>1/10/12</a:t>
+              <a:t>12/15/14</a:t>
             </a:fld>
             <a:endParaRPr lang="en-US"/>
           </a:p>
@@ -1054,7 +1054,7 @@
           <a:p>
             <a:fld id="{BD359BB1-992F-D24C-A539-F1AEC9179E2A}" type="datetimeFigureOut">
               <a:rPr lang="en-US" smtClean="0"/>
-              <a:t>1/10/12</a:t>
+              <a:t>12/15/14</a:t>
             </a:fld>
             <a:endParaRPr lang="en-US"/>
           </a:p>
@@ -1342,7 +1342,7 @@
           <a:p>
             <a:fld id="{BD359BB1-992F-D24C-A539-F1AEC9179E2A}" type="datetimeFigureOut">
               <a:rPr lang="en-US" smtClean="0"/>
-              <a:t>1/10/12</a:t>
+              <a:t>12/15/14</a:t>
             </a:fld>
             <a:endParaRPr lang="en-US"/>
           </a:p>
@@ -1764,7 +1764,7 @@
           <a:p>
             <a:fld id="{BD359BB1-992F-D24C-A539-F1AEC9179E2A}" type="datetimeFigureOut">
               <a:rPr lang="en-US" smtClean="0"/>
-              <a:t>1/10/12</a:t>
+              <a:t>12/15/14</a:t>
             </a:fld>
             <a:endParaRPr lang="en-US"/>
           </a:p>
@@ -1882,7 +1882,7 @@
           <a:p>
             <a:fld id="{BD359BB1-992F-D24C-A539-F1AEC9179E2A}" type="datetimeFigureOut">
               <a:rPr lang="en-US" smtClean="0"/>
-              <a:t>1/10/12</a:t>
+              <a:t>12/15/14</a:t>
             </a:fld>
             <a:endParaRPr lang="en-US"/>
           </a:p>
@@ -1977,7 +1977,7 @@
           <a:p>
             <a:fld id="{BD359BB1-992F-D24C-A539-F1AEC9179E2A}" type="datetimeFigureOut">
               <a:rPr lang="en-US" smtClean="0"/>
-              <a:t>1/10/12</a:t>
+              <a:t>12/15/14</a:t>
             </a:fld>
             <a:endParaRPr lang="en-US"/>
           </a:p>
@@ -2254,7 +2254,7 @@
           <a:p>
             <a:fld id="{BD359BB1-992F-D24C-A539-F1AEC9179E2A}" type="datetimeFigureOut">
               <a:rPr lang="en-US" smtClean="0"/>
-              <a:t>1/10/12</a:t>
+              <a:t>12/15/14</a:t>
             </a:fld>
             <a:endParaRPr lang="en-US"/>
           </a:p>
@@ -2507,7 +2507,7 @@
           <a:p>
             <a:fld id="{BD359BB1-992F-D24C-A539-F1AEC9179E2A}" type="datetimeFigureOut">
               <a:rPr lang="en-US" smtClean="0"/>
-              <a:t>1/10/12</a:t>
+              <a:t>12/15/14</a:t>
             </a:fld>
             <a:endParaRPr lang="en-US"/>
           </a:p>
@@ -2720,7 +2720,7 @@
           <a:p>
             <a:fld id="{BD359BB1-992F-D24C-A539-F1AEC9179E2A}" type="datetimeFigureOut">
               <a:rPr lang="en-US" smtClean="0"/>
-              <a:t>1/10/12</a:t>
+              <a:t>12/15/14</a:t>
             </a:fld>
             <a:endParaRPr lang="en-US"/>
           </a:p>
@@ -5061,7 +5061,11 @@
             </a:r>
             <a:r>
               <a:rPr lang="en-US" sz="1000" b="1" i="1" dirty="0" smtClean="0"/>
-              <a:t>20(8), 1122—1132.</a:t>
+              <a:t>20(8), 1122—1132</a:t>
+            </a:r>
+            <a:r>
+              <a:rPr lang="en-US" sz="1000" b="1" i="1" dirty="0" smtClean="0"/>
+              <a:t>. (Note: This data set is not used)</a:t>
             </a:r>
             <a:endParaRPr lang="en-US" sz="1000" dirty="0" smtClean="0"/>
           </a:p>

</xml_diff>